<commit_message>
Make changes to 2nd example table based on Zebs comments
</commit_message>
<xml_diff>
--- a/docs/source/model_design/vivarium_overview/vivarium_versus_other_model_types/microsim_example_tables_editable.pptx
+++ b/docs/source/model_design/vivarium_overview/vivarium_versus_other_model_types/microsim_example_tables_editable.pptx
@@ -105,6 +105,11 @@
       </a:defRPr>
     </a:lvl9pPr>
   </p:defaultTextStyle>
+  <p:extLst>
+    <p:ext uri="{EFAFB233-063F-42B5-8137-9DF3F51BA10A}">
+      <p15:sldGuideLst xmlns:p15="http://schemas.microsoft.com/office/powerpoint/2012/main"/>
+    </p:ext>
+  </p:extLst>
 </p:presentation>
 </file>
 
@@ -247,7 +252,7 @@
           <a:p>
             <a:fld id="{3B7A0C4F-527F-4491-BB27-4483CBF8E8FD}" type="datetimeFigureOut">
               <a:rPr lang="en-US" smtClean="0"/>
-              <a:t>10/27/2023</a:t>
+              <a:t>11/1/2023</a:t>
             </a:fld>
             <a:endParaRPr lang="en-US"/>
           </a:p>
@@ -417,7 +422,7 @@
           <a:p>
             <a:fld id="{3B7A0C4F-527F-4491-BB27-4483CBF8E8FD}" type="datetimeFigureOut">
               <a:rPr lang="en-US" smtClean="0"/>
-              <a:t>10/27/2023</a:t>
+              <a:t>11/1/2023</a:t>
             </a:fld>
             <a:endParaRPr lang="en-US"/>
           </a:p>
@@ -597,7 +602,7 @@
           <a:p>
             <a:fld id="{3B7A0C4F-527F-4491-BB27-4483CBF8E8FD}" type="datetimeFigureOut">
               <a:rPr lang="en-US" smtClean="0"/>
-              <a:t>10/27/2023</a:t>
+              <a:t>11/1/2023</a:t>
             </a:fld>
             <a:endParaRPr lang="en-US"/>
           </a:p>
@@ -767,7 +772,7 @@
           <a:p>
             <a:fld id="{3B7A0C4F-527F-4491-BB27-4483CBF8E8FD}" type="datetimeFigureOut">
               <a:rPr lang="en-US" smtClean="0"/>
-              <a:t>10/27/2023</a:t>
+              <a:t>11/1/2023</a:t>
             </a:fld>
             <a:endParaRPr lang="en-US"/>
           </a:p>
@@ -1013,7 +1018,7 @@
           <a:p>
             <a:fld id="{3B7A0C4F-527F-4491-BB27-4483CBF8E8FD}" type="datetimeFigureOut">
               <a:rPr lang="en-US" smtClean="0"/>
-              <a:t>10/27/2023</a:t>
+              <a:t>11/1/2023</a:t>
             </a:fld>
             <a:endParaRPr lang="en-US"/>
           </a:p>
@@ -1245,7 +1250,7 @@
           <a:p>
             <a:fld id="{3B7A0C4F-527F-4491-BB27-4483CBF8E8FD}" type="datetimeFigureOut">
               <a:rPr lang="en-US" smtClean="0"/>
-              <a:t>10/27/2023</a:t>
+              <a:t>11/1/2023</a:t>
             </a:fld>
             <a:endParaRPr lang="en-US"/>
           </a:p>
@@ -1612,7 +1617,7 @@
           <a:p>
             <a:fld id="{3B7A0C4F-527F-4491-BB27-4483CBF8E8FD}" type="datetimeFigureOut">
               <a:rPr lang="en-US" smtClean="0"/>
-              <a:t>10/27/2023</a:t>
+              <a:t>11/1/2023</a:t>
             </a:fld>
             <a:endParaRPr lang="en-US"/>
           </a:p>
@@ -1730,7 +1735,7 @@
           <a:p>
             <a:fld id="{3B7A0C4F-527F-4491-BB27-4483CBF8E8FD}" type="datetimeFigureOut">
               <a:rPr lang="en-US" smtClean="0"/>
-              <a:t>10/27/2023</a:t>
+              <a:t>11/1/2023</a:t>
             </a:fld>
             <a:endParaRPr lang="en-US"/>
           </a:p>
@@ -1825,7 +1830,7 @@
           <a:p>
             <a:fld id="{3B7A0C4F-527F-4491-BB27-4483CBF8E8FD}" type="datetimeFigureOut">
               <a:rPr lang="en-US" smtClean="0"/>
-              <a:t>10/27/2023</a:t>
+              <a:t>11/1/2023</a:t>
             </a:fld>
             <a:endParaRPr lang="en-US"/>
           </a:p>
@@ -2102,7 +2107,7 @@
           <a:p>
             <a:fld id="{3B7A0C4F-527F-4491-BB27-4483CBF8E8FD}" type="datetimeFigureOut">
               <a:rPr lang="en-US" smtClean="0"/>
-              <a:t>10/27/2023</a:t>
+              <a:t>11/1/2023</a:t>
             </a:fld>
             <a:endParaRPr lang="en-US"/>
           </a:p>
@@ -2359,7 +2364,7 @@
           <a:p>
             <a:fld id="{3B7A0C4F-527F-4491-BB27-4483CBF8E8FD}" type="datetimeFigureOut">
               <a:rPr lang="en-US" smtClean="0"/>
-              <a:t>10/27/2023</a:t>
+              <a:t>11/1/2023</a:t>
             </a:fld>
             <a:endParaRPr lang="en-US"/>
           </a:p>
@@ -2572,7 +2577,7 @@
           <a:p>
             <a:fld id="{3B7A0C4F-527F-4491-BB27-4483CBF8E8FD}" type="datetimeFigureOut">
               <a:rPr lang="en-US" smtClean="0"/>
-              <a:t>10/27/2023</a:t>
+              <a:t>11/1/2023</a:t>
             </a:fld>
             <a:endParaRPr lang="en-US"/>
           </a:p>
@@ -3596,14 +3601,14 @@
           <p:nvPr>
             <p:extLst>
               <p:ext uri="{D42A27DB-BD31-4B8C-83A1-F6EECF244321}">
-                <p14:modId xmlns:p14="http://schemas.microsoft.com/office/powerpoint/2010/main" val="943336714"/>
+                <p14:modId xmlns:p14="http://schemas.microsoft.com/office/powerpoint/2010/main" val="3022189704"/>
               </p:ext>
             </p:extLst>
           </p:nvPr>
         </p:nvGraphicFramePr>
         <p:xfrm>
           <a:off x="1166449" y="760458"/>
-          <a:ext cx="4792723" cy="3841562"/>
+          <a:ext cx="4792723" cy="4998187"/>
         </p:xfrm>
         <a:graphic>
           <a:graphicData uri="http://schemas.openxmlformats.org/drawingml/2006/table">
@@ -4086,6 +4091,87 @@
                   </a:ext>
                 </a:extLst>
               </a:tr>
+              <a:tr h="385880">
+                <a:tc gridSpan="7">
+                  <a:txBody>
+                    <a:bodyPr/>
+                    <a:lstStyle/>
+                    <a:p>
+                      <a:pPr algn="ctr"/>
+                      <a:r>
+                        <a:rPr lang="en-US" i="1" dirty="0"/>
+                        <a:t>… 2 days pass in the simulation ... </a:t>
+                      </a:r>
+                    </a:p>
+                  </a:txBody>
+                  <a:tcPr/>
+                </a:tc>
+                <a:tc hMerge="1">
+                  <a:txBody>
+                    <a:bodyPr/>
+                    <a:lstStyle/>
+                    <a:p>
+                      <a:endParaRPr lang="en-US" dirty="0"/>
+                    </a:p>
+                  </a:txBody>
+                  <a:tcPr/>
+                </a:tc>
+                <a:tc hMerge="1">
+                  <a:txBody>
+                    <a:bodyPr/>
+                    <a:lstStyle/>
+                    <a:p>
+                      <a:endParaRPr lang="en-US" dirty="0"/>
+                    </a:p>
+                  </a:txBody>
+                  <a:tcPr/>
+                </a:tc>
+                <a:tc hMerge="1">
+                  <a:txBody>
+                    <a:bodyPr/>
+                    <a:lstStyle/>
+                    <a:p>
+                      <a:endParaRPr lang="en-US" dirty="0"/>
+                    </a:p>
+                  </a:txBody>
+                  <a:tcPr/>
+                </a:tc>
+                <a:tc hMerge="1">
+                  <a:txBody>
+                    <a:bodyPr/>
+                    <a:lstStyle/>
+                    <a:p>
+                      <a:endParaRPr lang="en-US" dirty="0"/>
+                    </a:p>
+                  </a:txBody>
+                  <a:tcPr/>
+                </a:tc>
+                <a:tc hMerge="1">
+                  <a:txBody>
+                    <a:bodyPr/>
+                    <a:lstStyle/>
+                    <a:p>
+                      <a:endParaRPr lang="en-US" dirty="0"/>
+                    </a:p>
+                  </a:txBody>
+                  <a:tcPr/>
+                </a:tc>
+                <a:tc hMerge="1">
+                  <a:txBody>
+                    <a:bodyPr/>
+                    <a:lstStyle/>
+                    <a:p>
+                      <a:endParaRPr lang="en-US" dirty="0"/>
+                    </a:p>
+                  </a:txBody>
+                  <a:tcPr/>
+                </a:tc>
+                <a:extLst>
+                  <a:ext uri="{0D108BD9-81ED-4DB2-BD59-A6C34878D82A}">
+                    <a16:rowId xmlns:a16="http://schemas.microsoft.com/office/drawing/2014/main" val="887302584"/>
+                  </a:ext>
+                </a:extLst>
+              </a:tr>
               <a:tr h="360796">
                 <a:tc>
                   <a:txBody>
@@ -4184,6 +4270,103 @@
                   </a:ext>
                 </a:extLst>
               </a:tr>
+              <a:tr h="360796">
+                <a:tc gridSpan="7">
+                  <a:txBody>
+                    <a:bodyPr/>
+                    <a:lstStyle/>
+                    <a:p>
+                      <a:pPr marL="0" marR="0" lvl="0" indent="0" algn="ctr" defTabSz="914400" rtl="0" eaLnBrk="1" fontAlgn="auto" latinLnBrk="0" hangingPunct="1">
+                        <a:lnSpc>
+                          <a:spcPct val="100000"/>
+                        </a:lnSpc>
+                        <a:spcBef>
+                          <a:spcPts val="0"/>
+                        </a:spcBef>
+                        <a:spcAft>
+                          <a:spcPts val="0"/>
+                        </a:spcAft>
+                        <a:buClrTx/>
+                        <a:buSzTx/>
+                        <a:buFontTx/>
+                        <a:buNone/>
+                        <a:tabLst/>
+                        <a:defRPr/>
+                      </a:pPr>
+                      <a:r>
+                        <a:rPr lang="en-US" i="1" dirty="0"/>
+                        <a:t>… 2 more days pass ... </a:t>
+                      </a:r>
+                    </a:p>
+                  </a:txBody>
+                  <a:tcPr anchor="ctr"/>
+                </a:tc>
+                <a:tc hMerge="1">
+                  <a:txBody>
+                    <a:bodyPr/>
+                    <a:lstStyle/>
+                    <a:p>
+                      <a:endParaRPr lang="en-US" dirty="0"/>
+                    </a:p>
+                  </a:txBody>
+                  <a:tcPr/>
+                </a:tc>
+                <a:tc hMerge="1">
+                  <a:txBody>
+                    <a:bodyPr/>
+                    <a:lstStyle/>
+                    <a:p>
+                      <a:endParaRPr lang="en-US" dirty="0"/>
+                    </a:p>
+                  </a:txBody>
+                  <a:tcPr/>
+                </a:tc>
+                <a:tc hMerge="1">
+                  <a:txBody>
+                    <a:bodyPr/>
+                    <a:lstStyle/>
+                    <a:p>
+                      <a:endParaRPr lang="en-US" dirty="0"/>
+                    </a:p>
+                  </a:txBody>
+                  <a:tcPr/>
+                </a:tc>
+                <a:tc hMerge="1">
+                  <a:txBody>
+                    <a:bodyPr/>
+                    <a:lstStyle/>
+                    <a:p>
+                      <a:endParaRPr lang="en-US" dirty="0"/>
+                    </a:p>
+                  </a:txBody>
+                  <a:tcPr/>
+                </a:tc>
+                <a:tc hMerge="1">
+                  <a:txBody>
+                    <a:bodyPr/>
+                    <a:lstStyle/>
+                    <a:p>
+                      <a:endParaRPr lang="en-US" dirty="0"/>
+                    </a:p>
+                  </a:txBody>
+                  <a:tcPr/>
+                </a:tc>
+                <a:tc hMerge="1">
+                  <a:txBody>
+                    <a:bodyPr/>
+                    <a:lstStyle/>
+                    <a:p>
+                      <a:endParaRPr lang="en-US" dirty="0"/>
+                    </a:p>
+                  </a:txBody>
+                  <a:tcPr/>
+                </a:tc>
+                <a:extLst>
+                  <a:ext uri="{0D108BD9-81ED-4DB2-BD59-A6C34878D82A}">
+                    <a16:rowId xmlns:a16="http://schemas.microsoft.com/office/drawing/2014/main" val="2119180287"/>
+                  </a:ext>
+                </a:extLst>
+              </a:tr>
               <a:tr h="404985">
                 <a:tc>
                   <a:txBody>
@@ -4279,6 +4462,87 @@
                 <a:extLst>
                   <a:ext uri="{0D108BD9-81ED-4DB2-BD59-A6C34878D82A}">
                     <a16:rowId xmlns:a16="http://schemas.microsoft.com/office/drawing/2014/main" val="1444522398"/>
+                  </a:ext>
+                </a:extLst>
+              </a:tr>
+              <a:tr h="404985">
+                <a:tc gridSpan="7">
+                  <a:txBody>
+                    <a:bodyPr/>
+                    <a:lstStyle/>
+                    <a:p>
+                      <a:pPr algn="ctr"/>
+                      <a:r>
+                        <a:rPr lang="en-US" i="1" dirty="0"/>
+                        <a:t>… 2 more days pass …</a:t>
+                      </a:r>
+                    </a:p>
+                  </a:txBody>
+                  <a:tcPr/>
+                </a:tc>
+                <a:tc hMerge="1">
+                  <a:txBody>
+                    <a:bodyPr/>
+                    <a:lstStyle/>
+                    <a:p>
+                      <a:endParaRPr lang="en-US" dirty="0"/>
+                    </a:p>
+                  </a:txBody>
+                  <a:tcPr/>
+                </a:tc>
+                <a:tc hMerge="1">
+                  <a:txBody>
+                    <a:bodyPr/>
+                    <a:lstStyle/>
+                    <a:p>
+                      <a:endParaRPr lang="en-US" dirty="0"/>
+                    </a:p>
+                  </a:txBody>
+                  <a:tcPr/>
+                </a:tc>
+                <a:tc hMerge="1">
+                  <a:txBody>
+                    <a:bodyPr/>
+                    <a:lstStyle/>
+                    <a:p>
+                      <a:endParaRPr lang="en-US" dirty="0"/>
+                    </a:p>
+                  </a:txBody>
+                  <a:tcPr/>
+                </a:tc>
+                <a:tc hMerge="1">
+                  <a:txBody>
+                    <a:bodyPr/>
+                    <a:lstStyle/>
+                    <a:p>
+                      <a:endParaRPr lang="en-US" dirty="0"/>
+                    </a:p>
+                  </a:txBody>
+                  <a:tcPr/>
+                </a:tc>
+                <a:tc hMerge="1">
+                  <a:txBody>
+                    <a:bodyPr/>
+                    <a:lstStyle/>
+                    <a:p>
+                      <a:endParaRPr lang="en-US" dirty="0"/>
+                    </a:p>
+                  </a:txBody>
+                  <a:tcPr/>
+                </a:tc>
+                <a:tc hMerge="1">
+                  <a:txBody>
+                    <a:bodyPr/>
+                    <a:lstStyle/>
+                    <a:p>
+                      <a:endParaRPr lang="en-US" dirty="0"/>
+                    </a:p>
+                  </a:txBody>
+                  <a:tcPr/>
+                </a:tc>
+                <a:extLst>
+                  <a:ext uri="{0D108BD9-81ED-4DB2-BD59-A6C34878D82A}">
+                    <a16:rowId xmlns:a16="http://schemas.microsoft.com/office/drawing/2014/main" val="162268071"/>
                   </a:ext>
                 </a:extLst>
               </a:tr>
@@ -4399,14 +4663,14 @@
           <p:nvPr>
             <p:extLst>
               <p:ext uri="{D42A27DB-BD31-4B8C-83A1-F6EECF244321}">
-                <p14:modId xmlns:p14="http://schemas.microsoft.com/office/powerpoint/2010/main" val="3826144908"/>
+                <p14:modId xmlns:p14="http://schemas.microsoft.com/office/powerpoint/2010/main" val="977590106"/>
               </p:ext>
             </p:extLst>
           </p:nvPr>
         </p:nvGraphicFramePr>
         <p:xfrm>
-          <a:off x="5959172" y="760458"/>
-          <a:ext cx="4792723" cy="3841562"/>
+          <a:off x="6031138" y="760457"/>
+          <a:ext cx="4792723" cy="4998187"/>
         </p:xfrm>
         <a:graphic>
           <a:graphicData uri="http://schemas.openxmlformats.org/drawingml/2006/table">
@@ -4889,6 +5153,103 @@
                   </a:ext>
                 </a:extLst>
               </a:tr>
+              <a:tr h="385880">
+                <a:tc gridSpan="7">
+                  <a:txBody>
+                    <a:bodyPr/>
+                    <a:lstStyle/>
+                    <a:p>
+                      <a:pPr marL="0" marR="0" lvl="0" indent="0" algn="ctr" defTabSz="914400" rtl="0" eaLnBrk="1" fontAlgn="auto" latinLnBrk="0" hangingPunct="1">
+                        <a:lnSpc>
+                          <a:spcPct val="100000"/>
+                        </a:lnSpc>
+                        <a:spcBef>
+                          <a:spcPts val="0"/>
+                        </a:spcBef>
+                        <a:spcAft>
+                          <a:spcPts val="0"/>
+                        </a:spcAft>
+                        <a:buClrTx/>
+                        <a:buSzTx/>
+                        <a:buFontTx/>
+                        <a:buNone/>
+                        <a:tabLst/>
+                        <a:defRPr/>
+                      </a:pPr>
+                      <a:r>
+                        <a:rPr lang="en-US" i="1" dirty="0"/>
+                        <a:t>… 2 days pass in the simulation ... </a:t>
+                      </a:r>
+                    </a:p>
+                  </a:txBody>
+                  <a:tcPr/>
+                </a:tc>
+                <a:tc hMerge="1">
+                  <a:txBody>
+                    <a:bodyPr/>
+                    <a:lstStyle/>
+                    <a:p>
+                      <a:endParaRPr lang="en-US" dirty="0"/>
+                    </a:p>
+                  </a:txBody>
+                  <a:tcPr/>
+                </a:tc>
+                <a:tc hMerge="1">
+                  <a:txBody>
+                    <a:bodyPr/>
+                    <a:lstStyle/>
+                    <a:p>
+                      <a:endParaRPr lang="en-US" dirty="0"/>
+                    </a:p>
+                  </a:txBody>
+                  <a:tcPr/>
+                </a:tc>
+                <a:tc hMerge="1">
+                  <a:txBody>
+                    <a:bodyPr/>
+                    <a:lstStyle/>
+                    <a:p>
+                      <a:endParaRPr lang="en-US" dirty="0"/>
+                    </a:p>
+                  </a:txBody>
+                  <a:tcPr/>
+                </a:tc>
+                <a:tc hMerge="1">
+                  <a:txBody>
+                    <a:bodyPr/>
+                    <a:lstStyle/>
+                    <a:p>
+                      <a:endParaRPr lang="en-US" dirty="0"/>
+                    </a:p>
+                  </a:txBody>
+                  <a:tcPr/>
+                </a:tc>
+                <a:tc hMerge="1">
+                  <a:txBody>
+                    <a:bodyPr/>
+                    <a:lstStyle/>
+                    <a:p>
+                      <a:endParaRPr lang="en-US" dirty="0"/>
+                    </a:p>
+                  </a:txBody>
+                  <a:tcPr/>
+                </a:tc>
+                <a:tc hMerge="1">
+                  <a:txBody>
+                    <a:bodyPr/>
+                    <a:lstStyle/>
+                    <a:p>
+                      <a:endParaRPr lang="en-US" dirty="0"/>
+                    </a:p>
+                  </a:txBody>
+                  <a:tcPr/>
+                </a:tc>
+                <a:extLst>
+                  <a:ext uri="{0D108BD9-81ED-4DB2-BD59-A6C34878D82A}">
+                    <a16:rowId xmlns:a16="http://schemas.microsoft.com/office/drawing/2014/main" val="2456591139"/>
+                  </a:ext>
+                </a:extLst>
+              </a:tr>
               <a:tr h="360796">
                 <a:tc>
                   <a:txBody>
@@ -4987,6 +5348,103 @@
                   </a:ext>
                 </a:extLst>
               </a:tr>
+              <a:tr h="360796">
+                <a:tc gridSpan="7">
+                  <a:txBody>
+                    <a:bodyPr/>
+                    <a:lstStyle/>
+                    <a:p>
+                      <a:pPr marL="0" marR="0" lvl="0" indent="0" algn="ctr" defTabSz="914400" rtl="0" eaLnBrk="1" fontAlgn="auto" latinLnBrk="0" hangingPunct="1">
+                        <a:lnSpc>
+                          <a:spcPct val="100000"/>
+                        </a:lnSpc>
+                        <a:spcBef>
+                          <a:spcPts val="0"/>
+                        </a:spcBef>
+                        <a:spcAft>
+                          <a:spcPts val="0"/>
+                        </a:spcAft>
+                        <a:buClrTx/>
+                        <a:buSzTx/>
+                        <a:buFontTx/>
+                        <a:buNone/>
+                        <a:tabLst/>
+                        <a:defRPr/>
+                      </a:pPr>
+                      <a:r>
+                        <a:rPr lang="en-US" i="1" dirty="0"/>
+                        <a:t>… 2 more days pass ... </a:t>
+                      </a:r>
+                    </a:p>
+                  </a:txBody>
+                  <a:tcPr/>
+                </a:tc>
+                <a:tc hMerge="1">
+                  <a:txBody>
+                    <a:bodyPr/>
+                    <a:lstStyle/>
+                    <a:p>
+                      <a:endParaRPr lang="en-US" dirty="0"/>
+                    </a:p>
+                  </a:txBody>
+                  <a:tcPr/>
+                </a:tc>
+                <a:tc hMerge="1">
+                  <a:txBody>
+                    <a:bodyPr/>
+                    <a:lstStyle/>
+                    <a:p>
+                      <a:endParaRPr lang="en-US" dirty="0"/>
+                    </a:p>
+                  </a:txBody>
+                  <a:tcPr/>
+                </a:tc>
+                <a:tc hMerge="1">
+                  <a:txBody>
+                    <a:bodyPr/>
+                    <a:lstStyle/>
+                    <a:p>
+                      <a:endParaRPr lang="en-US" dirty="0"/>
+                    </a:p>
+                  </a:txBody>
+                  <a:tcPr/>
+                </a:tc>
+                <a:tc hMerge="1">
+                  <a:txBody>
+                    <a:bodyPr/>
+                    <a:lstStyle/>
+                    <a:p>
+                      <a:endParaRPr lang="en-US" dirty="0"/>
+                    </a:p>
+                  </a:txBody>
+                  <a:tcPr/>
+                </a:tc>
+                <a:tc hMerge="1">
+                  <a:txBody>
+                    <a:bodyPr/>
+                    <a:lstStyle/>
+                    <a:p>
+                      <a:endParaRPr lang="en-US" dirty="0"/>
+                    </a:p>
+                  </a:txBody>
+                  <a:tcPr/>
+                </a:tc>
+                <a:tc hMerge="1">
+                  <a:txBody>
+                    <a:bodyPr/>
+                    <a:lstStyle/>
+                    <a:p>
+                      <a:endParaRPr lang="en-US" dirty="0"/>
+                    </a:p>
+                  </a:txBody>
+                  <a:tcPr/>
+                </a:tc>
+                <a:extLst>
+                  <a:ext uri="{0D108BD9-81ED-4DB2-BD59-A6C34878D82A}">
+                    <a16:rowId xmlns:a16="http://schemas.microsoft.com/office/drawing/2014/main" val="3802563973"/>
+                  </a:ext>
+                </a:extLst>
+              </a:tr>
               <a:tr h="404985">
                 <a:tc>
                   <a:txBody>
@@ -5082,6 +5540,103 @@
                 <a:extLst>
                   <a:ext uri="{0D108BD9-81ED-4DB2-BD59-A6C34878D82A}">
                     <a16:rowId xmlns:a16="http://schemas.microsoft.com/office/drawing/2014/main" val="1444522398"/>
+                  </a:ext>
+                </a:extLst>
+              </a:tr>
+              <a:tr h="404985">
+                <a:tc gridSpan="7">
+                  <a:txBody>
+                    <a:bodyPr/>
+                    <a:lstStyle/>
+                    <a:p>
+                      <a:pPr marL="0" marR="0" lvl="0" indent="0" algn="ctr" defTabSz="914400" rtl="0" eaLnBrk="1" fontAlgn="auto" latinLnBrk="0" hangingPunct="1">
+                        <a:lnSpc>
+                          <a:spcPct val="100000"/>
+                        </a:lnSpc>
+                        <a:spcBef>
+                          <a:spcPts val="0"/>
+                        </a:spcBef>
+                        <a:spcAft>
+                          <a:spcPts val="0"/>
+                        </a:spcAft>
+                        <a:buClrTx/>
+                        <a:buSzTx/>
+                        <a:buFontTx/>
+                        <a:buNone/>
+                        <a:tabLst/>
+                        <a:defRPr/>
+                      </a:pPr>
+                      <a:r>
+                        <a:rPr lang="en-US" i="1" dirty="0"/>
+                        <a:t>… 2 more days pass …</a:t>
+                      </a:r>
+                    </a:p>
+                  </a:txBody>
+                  <a:tcPr/>
+                </a:tc>
+                <a:tc hMerge="1">
+                  <a:txBody>
+                    <a:bodyPr/>
+                    <a:lstStyle/>
+                    <a:p>
+                      <a:endParaRPr lang="en-US" dirty="0"/>
+                    </a:p>
+                  </a:txBody>
+                  <a:tcPr/>
+                </a:tc>
+                <a:tc hMerge="1">
+                  <a:txBody>
+                    <a:bodyPr/>
+                    <a:lstStyle/>
+                    <a:p>
+                      <a:endParaRPr lang="en-US" dirty="0"/>
+                    </a:p>
+                  </a:txBody>
+                  <a:tcPr/>
+                </a:tc>
+                <a:tc hMerge="1">
+                  <a:txBody>
+                    <a:bodyPr/>
+                    <a:lstStyle/>
+                    <a:p>
+                      <a:endParaRPr lang="en-US" dirty="0"/>
+                    </a:p>
+                  </a:txBody>
+                  <a:tcPr/>
+                </a:tc>
+                <a:tc hMerge="1">
+                  <a:txBody>
+                    <a:bodyPr/>
+                    <a:lstStyle/>
+                    <a:p>
+                      <a:endParaRPr lang="en-US" dirty="0"/>
+                    </a:p>
+                  </a:txBody>
+                  <a:tcPr/>
+                </a:tc>
+                <a:tc hMerge="1">
+                  <a:txBody>
+                    <a:bodyPr/>
+                    <a:lstStyle/>
+                    <a:p>
+                      <a:endParaRPr lang="en-US" dirty="0"/>
+                    </a:p>
+                  </a:txBody>
+                  <a:tcPr/>
+                </a:tc>
+                <a:tc hMerge="1">
+                  <a:txBody>
+                    <a:bodyPr/>
+                    <a:lstStyle/>
+                    <a:p>
+                      <a:endParaRPr lang="en-US" dirty="0"/>
+                    </a:p>
+                  </a:txBody>
+                  <a:tcPr/>
+                </a:tc>
+                <a:extLst>
+                  <a:ext uri="{0D108BD9-81ED-4DB2-BD59-A6C34878D82A}">
+                    <a16:rowId xmlns:a16="http://schemas.microsoft.com/office/drawing/2014/main" val="1837391739"/>
                   </a:ext>
                 </a:extLst>
               </a:tr>

</xml_diff>